<commit_message>
Gulp eklärung und API details
</commit_message>
<xml_diff>
--- a/Hackschool.pptx
+++ b/Hackschool.pptx
@@ -223,7 +223,7 @@
           <a:p>
             <a:fld id="{418AA284-825F-4886-9A11-F48E5CF22948}" type="datetimeFigureOut">
               <a:rPr lang="de-DE" smtClean="0"/>
-              <a:t>16.09.16</a:t>
+              <a:t>16.09.2016</a:t>
             </a:fld>
             <a:endParaRPr lang="de-DE"/>
           </a:p>
@@ -287,38 +287,37 @@
           <a:p>
             <a:pPr lvl="0"/>
             <a:r>
-              <a:rPr lang="de-DE" smtClean="0"/>
+              <a:rPr lang="de-DE"/>
               <a:t>Textmasterformat bearbeiten</a:t>
             </a:r>
           </a:p>
           <a:p>
             <a:pPr lvl="1"/>
             <a:r>
-              <a:rPr lang="de-DE" smtClean="0"/>
+              <a:rPr lang="de-DE"/>
               <a:t>Zweite Ebene</a:t>
             </a:r>
           </a:p>
           <a:p>
             <a:pPr lvl="2"/>
             <a:r>
-              <a:rPr lang="de-DE" smtClean="0"/>
+              <a:rPr lang="de-DE"/>
               <a:t>Dritte Ebene</a:t>
             </a:r>
           </a:p>
           <a:p>
             <a:pPr lvl="3"/>
             <a:r>
-              <a:rPr lang="de-DE" smtClean="0"/>
+              <a:rPr lang="de-DE"/>
               <a:t>Vierte Ebene</a:t>
             </a:r>
           </a:p>
           <a:p>
             <a:pPr lvl="4"/>
             <a:r>
-              <a:rPr lang="de-DE" smtClean="0"/>
+              <a:rPr lang="de-DE"/>
               <a:t>Fünfte Ebene</a:t>
             </a:r>
-            <a:endParaRPr lang="de-DE"/>
           </a:p>
         </p:txBody>
       </p:sp>
@@ -533,10 +532,9 @@
           </a:lstStyle>
           <a:p>
             <a:r>
-              <a:rPr lang="de-DE" dirty="0" smtClean="0"/>
+              <a:rPr lang="de-DE" dirty="0"/>
               <a:t>Titelmasterformat durch Klicken bearbeiten</a:t>
             </a:r>
-            <a:endParaRPr lang="de-DE" dirty="0"/>
           </a:p>
         </p:txBody>
       </p:sp>
@@ -654,10 +652,9 @@
           </a:lstStyle>
           <a:p>
             <a:r>
-              <a:rPr lang="de-DE" dirty="0" smtClean="0"/>
+              <a:rPr lang="de-DE" dirty="0"/>
               <a:t>Formatvorlage des Untertitelmasters durch Klicken bearbeiten</a:t>
             </a:r>
-            <a:endParaRPr lang="de-DE" dirty="0"/>
           </a:p>
         </p:txBody>
       </p:sp>
@@ -678,7 +675,7 @@
           <a:p>
             <a:fld id="{49F58C5F-2A47-4155-8A24-93E4578DD726}" type="datetime1">
               <a:rPr lang="de-DE" smtClean="0"/>
-              <a:t>16.09.16</a:t>
+              <a:t>16.09.2016</a:t>
             </a:fld>
             <a:endParaRPr lang="de-DE"/>
           </a:p>
@@ -704,10 +701,9 @@
           </a:lstStyle>
           <a:p>
             <a:r>
-              <a:rPr lang="de-DE" dirty="0" smtClean="0"/>
+              <a:rPr lang="de-DE" dirty="0"/>
               <a:t>Thinktecture AG</a:t>
             </a:r>
-            <a:endParaRPr lang="de-DE" dirty="0"/>
           </a:p>
         </p:txBody>
       </p:sp>
@@ -744,13 +740,6 @@
   <p:clrMapOvr>
     <a:masterClrMapping/>
   </p:clrMapOvr>
-  <p:timing>
-    <p:tnLst>
-      <p:par>
-        <p:cTn id="1" dur="indefinite" restart="never" nodeType="tmRoot"/>
-      </p:par>
-    </p:tnLst>
-  </p:timing>
 </p:sldLayout>
 </file>
 
@@ -787,10 +776,9 @@
           <a:lstStyle/>
           <a:p>
             <a:r>
-              <a:rPr lang="de-DE" smtClean="0"/>
+              <a:rPr lang="de-DE"/>
               <a:t>Titelmasterformat durch Klicken bearbeiten</a:t>
             </a:r>
-            <a:endParaRPr lang="de-DE"/>
           </a:p>
         </p:txBody>
       </p:sp>
@@ -811,38 +799,37 @@
           <a:p>
             <a:pPr lvl="0"/>
             <a:r>
-              <a:rPr lang="de-DE" smtClean="0"/>
+              <a:rPr lang="de-DE"/>
               <a:t>Textmasterformat bearbeiten</a:t>
             </a:r>
           </a:p>
           <a:p>
             <a:pPr lvl="1"/>
             <a:r>
-              <a:rPr lang="de-DE" smtClean="0"/>
+              <a:rPr lang="de-DE"/>
               <a:t>Zweite Ebene</a:t>
             </a:r>
           </a:p>
           <a:p>
             <a:pPr lvl="2"/>
             <a:r>
-              <a:rPr lang="de-DE" smtClean="0"/>
+              <a:rPr lang="de-DE"/>
               <a:t>Dritte Ebene</a:t>
             </a:r>
           </a:p>
           <a:p>
             <a:pPr lvl="3"/>
             <a:r>
-              <a:rPr lang="de-DE" smtClean="0"/>
+              <a:rPr lang="de-DE"/>
               <a:t>Vierte Ebene</a:t>
             </a:r>
           </a:p>
           <a:p>
             <a:pPr lvl="4"/>
             <a:r>
-              <a:rPr lang="de-DE" smtClean="0"/>
+              <a:rPr lang="de-DE"/>
               <a:t>Fünfte Ebene</a:t>
             </a:r>
-            <a:endParaRPr lang="de-DE"/>
           </a:p>
         </p:txBody>
       </p:sp>
@@ -863,7 +850,7 @@
           <a:p>
             <a:fld id="{6CC1F0CD-C325-45B2-84F0-EC7EE2C11FF8}" type="datetime1">
               <a:rPr lang="de-DE" smtClean="0"/>
-              <a:t>16.09.16</a:t>
+              <a:t>16.09.2016</a:t>
             </a:fld>
             <a:endParaRPr lang="de-DE"/>
           </a:p>
@@ -885,10 +872,9 @@
           <a:lstStyle/>
           <a:p>
             <a:r>
-              <a:rPr lang="de-DE" dirty="0" smtClean="0"/>
+              <a:rPr lang="de-DE" dirty="0"/>
               <a:t>Thinktecture AG</a:t>
             </a:r>
-            <a:endParaRPr lang="de-DE" dirty="0"/>
           </a:p>
         </p:txBody>
       </p:sp>
@@ -966,10 +952,9 @@
           <a:lstStyle/>
           <a:p>
             <a:r>
-              <a:rPr lang="de-DE" smtClean="0"/>
+              <a:rPr lang="de-DE"/>
               <a:t>Titelmasterformat durch Klicken bearbeiten</a:t>
             </a:r>
-            <a:endParaRPr lang="de-DE"/>
           </a:p>
         </p:txBody>
       </p:sp>
@@ -995,38 +980,37 @@
           <a:p>
             <a:pPr lvl="0"/>
             <a:r>
-              <a:rPr lang="de-DE" smtClean="0"/>
+              <a:rPr lang="de-DE"/>
               <a:t>Textmasterformat bearbeiten</a:t>
             </a:r>
           </a:p>
           <a:p>
             <a:pPr lvl="1"/>
             <a:r>
-              <a:rPr lang="de-DE" smtClean="0"/>
+              <a:rPr lang="de-DE"/>
               <a:t>Zweite Ebene</a:t>
             </a:r>
           </a:p>
           <a:p>
             <a:pPr lvl="2"/>
             <a:r>
-              <a:rPr lang="de-DE" smtClean="0"/>
+              <a:rPr lang="de-DE"/>
               <a:t>Dritte Ebene</a:t>
             </a:r>
           </a:p>
           <a:p>
             <a:pPr lvl="3"/>
             <a:r>
-              <a:rPr lang="de-DE" smtClean="0"/>
+              <a:rPr lang="de-DE"/>
               <a:t>Vierte Ebene</a:t>
             </a:r>
           </a:p>
           <a:p>
             <a:pPr lvl="4"/>
             <a:r>
-              <a:rPr lang="de-DE" smtClean="0"/>
+              <a:rPr lang="de-DE"/>
               <a:t>Fünfte Ebene</a:t>
             </a:r>
-            <a:endParaRPr lang="de-DE"/>
           </a:p>
         </p:txBody>
       </p:sp>
@@ -1047,7 +1031,7 @@
           <a:p>
             <a:fld id="{A0461D7F-EDF9-4AF0-AA91-65D7B548FB29}" type="datetime1">
               <a:rPr lang="de-DE" smtClean="0"/>
-              <a:t>16.09.16</a:t>
+              <a:t>16.09.2016</a:t>
             </a:fld>
             <a:endParaRPr lang="de-DE"/>
           </a:p>
@@ -1069,10 +1053,9 @@
           <a:lstStyle/>
           <a:p>
             <a:r>
-              <a:rPr lang="de-DE" dirty="0" smtClean="0"/>
+              <a:rPr lang="de-DE" dirty="0"/>
               <a:t>Thinktecture AG</a:t>
             </a:r>
-            <a:endParaRPr lang="de-DE" dirty="0"/>
           </a:p>
         </p:txBody>
       </p:sp>
@@ -1145,10 +1128,9 @@
           <a:lstStyle/>
           <a:p>
             <a:r>
-              <a:rPr lang="de-DE" smtClean="0"/>
+              <a:rPr lang="de-DE"/>
               <a:t>Titelmasterformat durch Klicken bearbeiten</a:t>
             </a:r>
-            <a:endParaRPr lang="de-DE"/>
           </a:p>
         </p:txBody>
       </p:sp>
@@ -1179,38 +1161,37 @@
           <a:p>
             <a:pPr lvl="0"/>
             <a:r>
-              <a:rPr lang="de-DE" dirty="0" smtClean="0"/>
+              <a:rPr lang="de-DE" dirty="0"/>
               <a:t>Textmasterformat bearbeiten</a:t>
             </a:r>
           </a:p>
           <a:p>
             <a:pPr lvl="1"/>
             <a:r>
-              <a:rPr lang="de-DE" dirty="0" smtClean="0"/>
+              <a:rPr lang="de-DE" dirty="0"/>
               <a:t>Zweite Ebene</a:t>
             </a:r>
           </a:p>
           <a:p>
             <a:pPr lvl="2"/>
             <a:r>
-              <a:rPr lang="de-DE" dirty="0" smtClean="0"/>
+              <a:rPr lang="de-DE" dirty="0"/>
               <a:t>Dritte Ebene</a:t>
             </a:r>
           </a:p>
           <a:p>
             <a:pPr lvl="3"/>
             <a:r>
-              <a:rPr lang="de-DE" dirty="0" smtClean="0"/>
+              <a:rPr lang="de-DE" dirty="0"/>
               <a:t>Vierte Ebene</a:t>
             </a:r>
           </a:p>
           <a:p>
             <a:pPr lvl="4"/>
             <a:r>
-              <a:rPr lang="de-DE" dirty="0" smtClean="0"/>
+              <a:rPr lang="de-DE" dirty="0"/>
               <a:t>Fünfte Ebene</a:t>
             </a:r>
-            <a:endParaRPr lang="de-DE" dirty="0"/>
           </a:p>
         </p:txBody>
       </p:sp>
@@ -1231,7 +1212,7 @@
           <a:p>
             <a:fld id="{3A735D52-20DE-4354-9C16-36FEBE25E686}" type="datetime1">
               <a:rPr lang="de-DE" smtClean="0"/>
-              <a:t>16.09.16</a:t>
+              <a:t>16.09.2016</a:t>
             </a:fld>
             <a:endParaRPr lang="de-DE"/>
           </a:p>
@@ -1253,10 +1234,9 @@
           <a:lstStyle/>
           <a:p>
             <a:r>
-              <a:rPr lang="de-DE" dirty="0" smtClean="0"/>
+              <a:rPr lang="de-DE" dirty="0"/>
               <a:t>Thinktecture AG</a:t>
             </a:r>
-            <a:endParaRPr lang="de-DE" dirty="0"/>
           </a:p>
         </p:txBody>
       </p:sp>
@@ -1293,13 +1273,6 @@
   <p:clrMapOvr>
     <a:masterClrMapping/>
   </p:clrMapOvr>
-  <p:timing>
-    <p:tnLst>
-      <p:par>
-        <p:cTn id="1" dur="indefinite" restart="never" nodeType="tmRoot"/>
-      </p:par>
-    </p:tnLst>
-  </p:timing>
 </p:sldLayout>
 </file>
 
@@ -1345,10 +1318,9 @@
           </a:lstStyle>
           <a:p>
             <a:r>
-              <a:rPr lang="de-DE" smtClean="0"/>
+              <a:rPr lang="de-DE"/>
               <a:t>Titelmasterformat durch Klicken bearbeiten</a:t>
             </a:r>
-            <a:endParaRPr lang="de-DE"/>
           </a:p>
         </p:txBody>
       </p:sp>
@@ -1465,7 +1437,7 @@
           <a:p>
             <a:pPr lvl="0"/>
             <a:r>
-              <a:rPr lang="de-DE" smtClean="0"/>
+              <a:rPr lang="de-DE"/>
               <a:t>Textmasterformat bearbeiten</a:t>
             </a:r>
           </a:p>
@@ -1488,7 +1460,7 @@
           <a:p>
             <a:fld id="{48FB9DC3-0B49-45DC-995E-D94736C3FACA}" type="datetime1">
               <a:rPr lang="de-DE" smtClean="0"/>
-              <a:t>16.09.16</a:t>
+              <a:t>16.09.2016</a:t>
             </a:fld>
             <a:endParaRPr lang="de-DE"/>
           </a:p>
@@ -1510,10 +1482,9 @@
           <a:lstStyle/>
           <a:p>
             <a:r>
-              <a:rPr lang="de-DE" dirty="0" smtClean="0"/>
+              <a:rPr lang="de-DE" dirty="0"/>
               <a:t>Thinktecture AG</a:t>
             </a:r>
-            <a:endParaRPr lang="de-DE" dirty="0"/>
           </a:p>
         </p:txBody>
       </p:sp>
@@ -1550,13 +1521,6 @@
   <p:clrMapOvr>
     <a:masterClrMapping/>
   </p:clrMapOvr>
-  <p:timing>
-    <p:tnLst>
-      <p:par>
-        <p:cTn id="1" dur="indefinite" restart="never" nodeType="tmRoot"/>
-      </p:par>
-    </p:tnLst>
-  </p:timing>
 </p:sldLayout>
 </file>
 
@@ -1593,10 +1557,9 @@
           <a:lstStyle/>
           <a:p>
             <a:r>
-              <a:rPr lang="de-DE" smtClean="0"/>
+              <a:rPr lang="de-DE"/>
               <a:t>Titelmasterformat durch Klicken bearbeiten</a:t>
             </a:r>
-            <a:endParaRPr lang="de-DE"/>
           </a:p>
         </p:txBody>
       </p:sp>
@@ -1650,38 +1613,37 @@
           <a:p>
             <a:pPr lvl="0"/>
             <a:r>
-              <a:rPr lang="de-DE" smtClean="0"/>
+              <a:rPr lang="de-DE"/>
               <a:t>Textmasterformat bearbeiten</a:t>
             </a:r>
           </a:p>
           <a:p>
             <a:pPr lvl="1"/>
             <a:r>
-              <a:rPr lang="de-DE" smtClean="0"/>
+              <a:rPr lang="de-DE"/>
               <a:t>Zweite Ebene</a:t>
             </a:r>
           </a:p>
           <a:p>
             <a:pPr lvl="2"/>
             <a:r>
-              <a:rPr lang="de-DE" smtClean="0"/>
+              <a:rPr lang="de-DE"/>
               <a:t>Dritte Ebene</a:t>
             </a:r>
           </a:p>
           <a:p>
             <a:pPr lvl="3"/>
             <a:r>
-              <a:rPr lang="de-DE" smtClean="0"/>
+              <a:rPr lang="de-DE"/>
               <a:t>Vierte Ebene</a:t>
             </a:r>
           </a:p>
           <a:p>
             <a:pPr lvl="4"/>
             <a:r>
-              <a:rPr lang="de-DE" smtClean="0"/>
+              <a:rPr lang="de-DE"/>
               <a:t>Fünfte Ebene</a:t>
             </a:r>
-            <a:endParaRPr lang="de-DE"/>
           </a:p>
         </p:txBody>
       </p:sp>
@@ -1735,38 +1697,37 @@
           <a:p>
             <a:pPr lvl="0"/>
             <a:r>
-              <a:rPr lang="de-DE" smtClean="0"/>
+              <a:rPr lang="de-DE"/>
               <a:t>Textmasterformat bearbeiten</a:t>
             </a:r>
           </a:p>
           <a:p>
             <a:pPr lvl="1"/>
             <a:r>
-              <a:rPr lang="de-DE" smtClean="0"/>
+              <a:rPr lang="de-DE"/>
               <a:t>Zweite Ebene</a:t>
             </a:r>
           </a:p>
           <a:p>
             <a:pPr lvl="2"/>
             <a:r>
-              <a:rPr lang="de-DE" smtClean="0"/>
+              <a:rPr lang="de-DE"/>
               <a:t>Dritte Ebene</a:t>
             </a:r>
           </a:p>
           <a:p>
             <a:pPr lvl="3"/>
             <a:r>
-              <a:rPr lang="de-DE" smtClean="0"/>
+              <a:rPr lang="de-DE"/>
               <a:t>Vierte Ebene</a:t>
             </a:r>
           </a:p>
           <a:p>
             <a:pPr lvl="4"/>
             <a:r>
-              <a:rPr lang="de-DE" smtClean="0"/>
+              <a:rPr lang="de-DE"/>
               <a:t>Fünfte Ebene</a:t>
             </a:r>
-            <a:endParaRPr lang="de-DE"/>
           </a:p>
         </p:txBody>
       </p:sp>
@@ -1787,7 +1748,7 @@
           <a:p>
             <a:fld id="{3D9C5F60-CD2F-4A29-B225-C68BEA969866}" type="datetime1">
               <a:rPr lang="de-DE" smtClean="0"/>
-              <a:t>16.09.16</a:t>
+              <a:t>16.09.2016</a:t>
             </a:fld>
             <a:endParaRPr lang="de-DE"/>
           </a:p>
@@ -1809,10 +1770,9 @@
           <a:lstStyle/>
           <a:p>
             <a:r>
-              <a:rPr lang="de-DE" dirty="0" smtClean="0"/>
+              <a:rPr lang="de-DE" dirty="0"/>
               <a:t>Thinktecture AG</a:t>
             </a:r>
-            <a:endParaRPr lang="de-DE" dirty="0"/>
           </a:p>
         </p:txBody>
       </p:sp>
@@ -1889,10 +1849,9 @@
           </a:lstStyle>
           <a:p>
             <a:r>
-              <a:rPr lang="de-DE" smtClean="0"/>
+              <a:rPr lang="de-DE"/>
               <a:t>Titelmasterformat durch Klicken bearbeiten</a:t>
             </a:r>
-            <a:endParaRPr lang="de-DE"/>
           </a:p>
         </p:txBody>
       </p:sp>
@@ -1955,7 +1914,7 @@
           <a:p>
             <a:pPr lvl="0"/>
             <a:r>
-              <a:rPr lang="de-DE" smtClean="0"/>
+              <a:rPr lang="de-DE"/>
               <a:t>Textmasterformat bearbeiten</a:t>
             </a:r>
           </a:p>
@@ -2011,38 +1970,37 @@
           <a:p>
             <a:pPr lvl="0"/>
             <a:r>
-              <a:rPr lang="de-DE" smtClean="0"/>
+              <a:rPr lang="de-DE"/>
               <a:t>Textmasterformat bearbeiten</a:t>
             </a:r>
           </a:p>
           <a:p>
             <a:pPr lvl="1"/>
             <a:r>
-              <a:rPr lang="de-DE" smtClean="0"/>
+              <a:rPr lang="de-DE"/>
               <a:t>Zweite Ebene</a:t>
             </a:r>
           </a:p>
           <a:p>
             <a:pPr lvl="2"/>
             <a:r>
-              <a:rPr lang="de-DE" smtClean="0"/>
+              <a:rPr lang="de-DE"/>
               <a:t>Dritte Ebene</a:t>
             </a:r>
           </a:p>
           <a:p>
             <a:pPr lvl="3"/>
             <a:r>
-              <a:rPr lang="de-DE" smtClean="0"/>
+              <a:rPr lang="de-DE"/>
               <a:t>Vierte Ebene</a:t>
             </a:r>
           </a:p>
           <a:p>
             <a:pPr lvl="4"/>
             <a:r>
-              <a:rPr lang="de-DE" smtClean="0"/>
+              <a:rPr lang="de-DE"/>
               <a:t>Fünfte Ebene</a:t>
             </a:r>
-            <a:endParaRPr lang="de-DE"/>
           </a:p>
         </p:txBody>
       </p:sp>
@@ -2105,7 +2063,7 @@
           <a:p>
             <a:pPr lvl="0"/>
             <a:r>
-              <a:rPr lang="de-DE" smtClean="0"/>
+              <a:rPr lang="de-DE"/>
               <a:t>Textmasterformat bearbeiten</a:t>
             </a:r>
           </a:p>
@@ -2161,38 +2119,37 @@
           <a:p>
             <a:pPr lvl="0"/>
             <a:r>
-              <a:rPr lang="de-DE" smtClean="0"/>
+              <a:rPr lang="de-DE"/>
               <a:t>Textmasterformat bearbeiten</a:t>
             </a:r>
           </a:p>
           <a:p>
             <a:pPr lvl="1"/>
             <a:r>
-              <a:rPr lang="de-DE" smtClean="0"/>
+              <a:rPr lang="de-DE"/>
               <a:t>Zweite Ebene</a:t>
             </a:r>
           </a:p>
           <a:p>
             <a:pPr lvl="2"/>
             <a:r>
-              <a:rPr lang="de-DE" smtClean="0"/>
+              <a:rPr lang="de-DE"/>
               <a:t>Dritte Ebene</a:t>
             </a:r>
           </a:p>
           <a:p>
             <a:pPr lvl="3"/>
             <a:r>
-              <a:rPr lang="de-DE" smtClean="0"/>
+              <a:rPr lang="de-DE"/>
               <a:t>Vierte Ebene</a:t>
             </a:r>
           </a:p>
           <a:p>
             <a:pPr lvl="4"/>
             <a:r>
-              <a:rPr lang="de-DE" smtClean="0"/>
+              <a:rPr lang="de-DE"/>
               <a:t>Fünfte Ebene</a:t>
             </a:r>
-            <a:endParaRPr lang="de-DE"/>
           </a:p>
         </p:txBody>
       </p:sp>
@@ -2213,7 +2170,7 @@
           <a:p>
             <a:fld id="{BA297D2E-C96F-45B3-BC0A-156A354E3A19}" type="datetime1">
               <a:rPr lang="de-DE" smtClean="0"/>
-              <a:t>16.09.16</a:t>
+              <a:t>16.09.2016</a:t>
             </a:fld>
             <a:endParaRPr lang="de-DE"/>
           </a:p>
@@ -2235,10 +2192,9 @@
           <a:lstStyle/>
           <a:p>
             <a:r>
-              <a:rPr lang="de-DE" dirty="0" smtClean="0"/>
+              <a:rPr lang="de-DE" dirty="0"/>
               <a:t>Thinktecture AG</a:t>
             </a:r>
-            <a:endParaRPr lang="de-DE" dirty="0"/>
           </a:p>
         </p:txBody>
       </p:sp>
@@ -2311,10 +2267,9 @@
           <a:lstStyle/>
           <a:p>
             <a:r>
-              <a:rPr lang="de-DE" smtClean="0"/>
+              <a:rPr lang="de-DE"/>
               <a:t>Titelmasterformat durch Klicken bearbeiten</a:t>
             </a:r>
-            <a:endParaRPr lang="de-DE"/>
           </a:p>
         </p:txBody>
       </p:sp>
@@ -2335,7 +2290,7 @@
           <a:p>
             <a:fld id="{8B7E8498-BFF7-4DD2-AB1B-D3ACA3638E74}" type="datetime1">
               <a:rPr lang="de-DE" smtClean="0"/>
-              <a:t>16.09.16</a:t>
+              <a:t>16.09.2016</a:t>
             </a:fld>
             <a:endParaRPr lang="de-DE"/>
           </a:p>
@@ -2357,10 +2312,9 @@
           <a:lstStyle/>
           <a:p>
             <a:r>
-              <a:rPr lang="de-DE" dirty="0" smtClean="0"/>
+              <a:rPr lang="de-DE" dirty="0"/>
               <a:t>Thinktecture AG</a:t>
             </a:r>
-            <a:endParaRPr lang="de-DE" dirty="0"/>
           </a:p>
         </p:txBody>
       </p:sp>
@@ -2434,7 +2388,7 @@
           <a:p>
             <a:fld id="{000A7196-2DAF-45A0-B938-B243C63B9C3A}" type="datetime1">
               <a:rPr lang="de-DE" smtClean="0"/>
-              <a:t>16.09.16</a:t>
+              <a:t>16.09.2016</a:t>
             </a:fld>
             <a:endParaRPr lang="de-DE"/>
           </a:p>
@@ -2456,10 +2410,9 @@
           <a:lstStyle/>
           <a:p>
             <a:r>
-              <a:rPr lang="de-DE" dirty="0" smtClean="0"/>
+              <a:rPr lang="de-DE" dirty="0"/>
               <a:t>Thinktecture AG</a:t>
             </a:r>
-            <a:endParaRPr lang="de-DE" dirty="0"/>
           </a:p>
         </p:txBody>
       </p:sp>
@@ -2541,10 +2494,9 @@
           </a:lstStyle>
           <a:p>
             <a:r>
-              <a:rPr lang="de-DE" smtClean="0"/>
+              <a:rPr lang="de-DE"/>
               <a:t>Titelmasterformat durch Klicken bearbeiten</a:t>
             </a:r>
-            <a:endParaRPr lang="de-DE"/>
           </a:p>
         </p:txBody>
       </p:sp>
@@ -2598,38 +2550,37 @@
           <a:p>
             <a:pPr lvl="0"/>
             <a:r>
-              <a:rPr lang="de-DE" smtClean="0"/>
+              <a:rPr lang="de-DE"/>
               <a:t>Textmasterformat bearbeiten</a:t>
             </a:r>
           </a:p>
           <a:p>
             <a:pPr lvl="1"/>
             <a:r>
-              <a:rPr lang="de-DE" smtClean="0"/>
+              <a:rPr lang="de-DE"/>
               <a:t>Zweite Ebene</a:t>
             </a:r>
           </a:p>
           <a:p>
             <a:pPr lvl="2"/>
             <a:r>
-              <a:rPr lang="de-DE" smtClean="0"/>
+              <a:rPr lang="de-DE"/>
               <a:t>Dritte Ebene</a:t>
             </a:r>
           </a:p>
           <a:p>
             <a:pPr lvl="3"/>
             <a:r>
-              <a:rPr lang="de-DE" smtClean="0"/>
+              <a:rPr lang="de-DE"/>
               <a:t>Vierte Ebene</a:t>
             </a:r>
           </a:p>
           <a:p>
             <a:pPr lvl="4"/>
             <a:r>
-              <a:rPr lang="de-DE" smtClean="0"/>
+              <a:rPr lang="de-DE"/>
               <a:t>Fünfte Ebene</a:t>
             </a:r>
-            <a:endParaRPr lang="de-DE"/>
           </a:p>
         </p:txBody>
       </p:sp>
@@ -2692,7 +2643,7 @@
           <a:p>
             <a:pPr lvl="0"/>
             <a:r>
-              <a:rPr lang="de-DE" smtClean="0"/>
+              <a:rPr lang="de-DE"/>
               <a:t>Textmasterformat bearbeiten</a:t>
             </a:r>
           </a:p>
@@ -2715,7 +2666,7 @@
           <a:p>
             <a:fld id="{A5C58A3D-8E51-4295-BEAC-4D2495FBAF92}" type="datetime1">
               <a:rPr lang="de-DE" smtClean="0"/>
-              <a:t>16.09.16</a:t>
+              <a:t>16.09.2016</a:t>
             </a:fld>
             <a:endParaRPr lang="de-DE"/>
           </a:p>
@@ -2737,10 +2688,9 @@
           <a:lstStyle/>
           <a:p>
             <a:r>
-              <a:rPr lang="de-DE" dirty="0" smtClean="0"/>
+              <a:rPr lang="de-DE" dirty="0"/>
               <a:t>Thinktecture AG</a:t>
             </a:r>
-            <a:endParaRPr lang="de-DE" dirty="0"/>
           </a:p>
         </p:txBody>
       </p:sp>
@@ -2822,10 +2772,9 @@
           </a:lstStyle>
           <a:p>
             <a:r>
-              <a:rPr lang="de-DE" smtClean="0"/>
+              <a:rPr lang="de-DE"/>
               <a:t>Titelmasterformat durch Klicken bearbeiten</a:t>
             </a:r>
-            <a:endParaRPr lang="de-DE"/>
           </a:p>
         </p:txBody>
       </p:sp>
@@ -2949,7 +2898,7 @@
           <a:p>
             <a:pPr lvl="0"/>
             <a:r>
-              <a:rPr lang="de-DE" smtClean="0"/>
+              <a:rPr lang="de-DE"/>
               <a:t>Textmasterformat bearbeiten</a:t>
             </a:r>
           </a:p>
@@ -2972,7 +2921,7 @@
           <a:p>
             <a:fld id="{78F0536F-C5C3-4B22-9F81-E0B6E31B69F0}" type="datetime1">
               <a:rPr lang="de-DE" smtClean="0"/>
-              <a:t>16.09.16</a:t>
+              <a:t>16.09.2016</a:t>
             </a:fld>
             <a:endParaRPr lang="de-DE"/>
           </a:p>
@@ -2994,10 +2943,9 @@
           <a:lstStyle/>
           <a:p>
             <a:r>
-              <a:rPr lang="de-DE" dirty="0" smtClean="0"/>
+              <a:rPr lang="de-DE" dirty="0"/>
               <a:t>Thinktecture AG</a:t>
             </a:r>
-            <a:endParaRPr lang="de-DE" dirty="0"/>
           </a:p>
         </p:txBody>
       </p:sp>
@@ -3135,10 +3083,9 @@
           <a:lstStyle/>
           <a:p>
             <a:r>
-              <a:rPr lang="de-DE" dirty="0" smtClean="0"/>
+              <a:rPr lang="de-DE" dirty="0"/>
               <a:t>Titelmasterformat durch Klicken bearbeiten</a:t>
             </a:r>
-            <a:endParaRPr lang="de-DE" dirty="0"/>
           </a:p>
         </p:txBody>
       </p:sp>
@@ -3169,38 +3116,37 @@
           <a:p>
             <a:pPr lvl="0"/>
             <a:r>
-              <a:rPr lang="de-DE" dirty="0" smtClean="0"/>
+              <a:rPr lang="de-DE" dirty="0"/>
               <a:t>Textmasterformat bearbeiten</a:t>
             </a:r>
           </a:p>
           <a:p>
             <a:pPr lvl="1"/>
             <a:r>
-              <a:rPr lang="de-DE" dirty="0" smtClean="0"/>
+              <a:rPr lang="de-DE" dirty="0"/>
               <a:t>Zweite Ebene</a:t>
             </a:r>
           </a:p>
           <a:p>
             <a:pPr lvl="2"/>
             <a:r>
-              <a:rPr lang="de-DE" dirty="0" smtClean="0"/>
+              <a:rPr lang="de-DE" dirty="0"/>
               <a:t>Dritte Ebene</a:t>
             </a:r>
           </a:p>
           <a:p>
             <a:pPr lvl="3"/>
             <a:r>
-              <a:rPr lang="de-DE" dirty="0" smtClean="0"/>
+              <a:rPr lang="de-DE" dirty="0"/>
               <a:t>Vierte Ebene</a:t>
             </a:r>
           </a:p>
           <a:p>
             <a:pPr lvl="4"/>
             <a:r>
-              <a:rPr lang="de-DE" dirty="0" smtClean="0"/>
+              <a:rPr lang="de-DE" dirty="0"/>
               <a:t>Fünfte Ebene</a:t>
             </a:r>
-            <a:endParaRPr lang="de-DE" dirty="0"/>
           </a:p>
         </p:txBody>
       </p:sp>
@@ -3238,7 +3184,7 @@
           <a:p>
             <a:fld id="{3EA40879-1D4E-4B48-87F7-898D964442F8}" type="datetime1">
               <a:rPr lang="de-DE" smtClean="0"/>
-              <a:t>16.09.16</a:t>
+              <a:t>16.09.2016</a:t>
             </a:fld>
             <a:endParaRPr lang="de-DE" dirty="0"/>
           </a:p>
@@ -3277,10 +3223,9 @@
           </a:lstStyle>
           <a:p>
             <a:r>
-              <a:rPr lang="de-DE" dirty="0" smtClean="0"/>
+              <a:rPr lang="de-DE" dirty="0"/>
               <a:t>Thinktecture AG</a:t>
             </a:r>
-            <a:endParaRPr lang="de-DE" dirty="0"/>
           </a:p>
         </p:txBody>
       </p:sp>
@@ -3471,13 +3416,6 @@
     <p:sldLayoutId id="2147483658" r:id="rId10"/>
     <p:sldLayoutId id="2147483659" r:id="rId11"/>
   </p:sldLayoutIdLst>
-  <p:timing>
-    <p:tnLst>
-      <p:par>
-        <p:cTn id="1" dur="indefinite" restart="never" nodeType="tmRoot"/>
-      </p:par>
-    </p:tnLst>
-  </p:timing>
   <p:hf hdr="0" dt="0"/>
   <p:txStyles>
     <p:titleStyle>
@@ -3768,15 +3706,15 @@
           <a:lstStyle/>
           <a:p>
             <a:r>
-              <a:rPr lang="en-US" sz="2800" dirty="0" err="1" smtClean="0"/>
+              <a:rPr lang="en-US" sz="2800" dirty="0" err="1"/>
               <a:t>Hackschool</a:t>
             </a:r>
             <a:r>
-              <a:rPr lang="en-US" sz="2800" dirty="0" smtClean="0"/>
+              <a:rPr lang="en-US" sz="2800" dirty="0"/>
               <a:t> - </a:t>
             </a:r>
             <a:r>
-              <a:rPr lang="en-US" sz="2800" dirty="0" err="1" smtClean="0"/>
+              <a:rPr lang="en-US" sz="2800" dirty="0" err="1"/>
               <a:t>Crossplattform</a:t>
             </a:r>
             <a:endParaRPr lang="en-US" sz="2800" dirty="0"/>
@@ -3806,7 +3744,7 @@
           <a:lstStyle/>
           <a:p>
             <a:r>
-              <a:rPr lang="en-US" sz="2400" dirty="0" smtClean="0">
+              <a:rPr lang="en-US" sz="2400" dirty="0">
                 <a:solidFill>
                   <a:schemeClr val="bg1">
                     <a:lumMod val="50000"/>
@@ -3816,7 +3754,7 @@
               <a:t>Steffen Jahr &amp; Sebastian </a:t>
             </a:r>
             <a:r>
-              <a:rPr lang="en-US" sz="2400" dirty="0" err="1" smtClean="0">
+              <a:rPr lang="en-US" sz="2400" dirty="0" err="1">
                 <a:solidFill>
                   <a:schemeClr val="bg1">
                     <a:lumMod val="50000"/>
@@ -3825,7 +3763,7 @@
               </a:rPr>
               <a:t>Gingter</a:t>
             </a:r>
-            <a:endParaRPr lang="en-US" sz="2400" dirty="0" smtClean="0">
+            <a:endParaRPr lang="en-US" sz="2400" dirty="0">
               <a:solidFill>
                 <a:schemeClr val="bg1">
                   <a:lumMod val="50000"/>
@@ -3835,7 +3773,7 @@
           </a:p>
           <a:p>
             <a:r>
-              <a:rPr lang="en-US" dirty="0" err="1" smtClean="0">
+              <a:rPr lang="en-US" dirty="0" err="1">
                 <a:solidFill>
                   <a:schemeClr val="bg1">
                     <a:lumMod val="50000"/>
@@ -3845,7 +3783,7 @@
               <a:t>Thinktecture</a:t>
             </a:r>
             <a:r>
-              <a:rPr lang="en-US" dirty="0" smtClean="0">
+              <a:rPr lang="en-US" dirty="0">
                 <a:solidFill>
                   <a:schemeClr val="bg1">
                     <a:lumMod val="50000"/>
@@ -3874,13 +3812,6 @@
   <p:clrMapOvr>
     <a:masterClrMapping/>
   </p:clrMapOvr>
-  <p:timing>
-    <p:tnLst>
-      <p:par>
-        <p:cTn id="1" dur="indefinite" restart="never" nodeType="tmRoot"/>
-      </p:par>
-    </p:tnLst>
-  </p:timing>
 </p:sld>
 </file>
 
@@ -3917,7 +3848,7 @@
           <a:lstStyle/>
           <a:p>
             <a:r>
-              <a:rPr lang="en-US" dirty="0" err="1" smtClean="0"/>
+              <a:rPr lang="en-US" dirty="0" err="1"/>
               <a:t>Direktiven</a:t>
             </a:r>
             <a:endParaRPr lang="en-US" dirty="0"/>
@@ -4005,7 +3936,7 @@
           <a:lstStyle/>
           <a:p>
             <a:r>
-              <a:rPr lang="de-DE" smtClean="0"/>
+              <a:rPr lang="de-DE"/>
               <a:t>Thinktecture AG</a:t>
             </a:r>
             <a:endParaRPr lang="de-DE" dirty="0"/>
@@ -4081,10 +4012,9 @@
           <a:lstStyle/>
           <a:p>
             <a:r>
-              <a:rPr lang="en-US" dirty="0" smtClean="0"/>
+              <a:rPr lang="en-US" dirty="0"/>
               <a:t>Bindings</a:t>
             </a:r>
-            <a:endParaRPr lang="en-US" dirty="0"/>
           </a:p>
         </p:txBody>
       </p:sp>
@@ -4181,7 +4111,7 @@
           <a:lstStyle/>
           <a:p>
             <a:r>
-              <a:rPr lang="de-DE" smtClean="0"/>
+              <a:rPr lang="de-DE"/>
               <a:t>Thinktecture AG</a:t>
             </a:r>
             <a:endParaRPr lang="de-DE" dirty="0"/>
@@ -4257,10 +4187,9 @@
           <a:lstStyle/>
           <a:p>
             <a:r>
-              <a:rPr lang="en-US" dirty="0" smtClean="0"/>
+              <a:rPr lang="en-US" dirty="0"/>
               <a:t>Routing</a:t>
             </a:r>
-            <a:endParaRPr lang="en-US" dirty="0"/>
           </a:p>
         </p:txBody>
       </p:sp>
@@ -4349,7 +4278,7 @@
           <a:lstStyle/>
           <a:p>
             <a:r>
-              <a:rPr lang="de-DE" smtClean="0"/>
+              <a:rPr lang="de-DE"/>
               <a:t>Thinktecture AG</a:t>
             </a:r>
             <a:endParaRPr lang="de-DE" dirty="0"/>
@@ -4425,37 +4354,178 @@
           <a:lstStyle/>
           <a:p>
             <a:r>
-              <a:rPr lang="en-US" dirty="0" smtClean="0"/>
+              <a:rPr lang="en-US" dirty="0"/>
               <a:t>Was </a:t>
             </a:r>
             <a:r>
-              <a:rPr lang="en-US" dirty="0" err="1" smtClean="0"/>
+              <a:rPr lang="en-US" dirty="0" err="1"/>
               <a:t>ist</a:t>
             </a:r>
             <a:r>
-              <a:rPr lang="en-US" dirty="0" smtClean="0"/>
+              <a:rPr lang="en-US" dirty="0"/>
               <a:t> Gulp?</a:t>
             </a:r>
+          </a:p>
+        </p:txBody>
+      </p:sp>
+      <p:sp>
+        <p:nvSpPr>
+          <p:cNvPr id="3" name="Content Placeholder 2"/>
+          <p:cNvSpPr>
+            <a:spLocks noGrp="1"/>
+          </p:cNvSpPr>
+          <p:nvPr>
+            <p:ph idx="1"/>
+          </p:nvPr>
+        </p:nvSpPr>
+        <p:spPr/>
+        <p:txBody>
+          <a:bodyPr/>
+          <a:lstStyle/>
+          <a:p>
+            <a:r>
+              <a:rPr lang="en-US" dirty="0"/>
+              <a:t>Gulp </a:t>
+            </a:r>
+            <a:r>
+              <a:rPr lang="en-US" dirty="0" err="1"/>
+              <a:t>ist</a:t>
+            </a:r>
+            <a:r>
+              <a:rPr lang="en-US" dirty="0"/>
+              <a:t> </a:t>
+            </a:r>
+            <a:r>
+              <a:rPr lang="en-US" dirty="0" err="1"/>
+              <a:t>ein</a:t>
+            </a:r>
+            <a:r>
+              <a:rPr lang="en-US" dirty="0"/>
+              <a:t> Task-Runner</a:t>
+            </a:r>
+          </a:p>
+          <a:p>
             <a:endParaRPr lang="en-US" dirty="0"/>
           </a:p>
-        </p:txBody>
-      </p:sp>
-      <p:sp>
-        <p:nvSpPr>
-          <p:cNvPr id="3" name="Content Placeholder 2"/>
-          <p:cNvSpPr>
-            <a:spLocks noGrp="1"/>
-          </p:cNvSpPr>
-          <p:nvPr>
-            <p:ph idx="1"/>
-          </p:nvPr>
-        </p:nvSpPr>
-        <p:spPr/>
-        <p:txBody>
-          <a:bodyPr/>
-          <a:lstStyle/>
-          <a:p>
-            <a:endParaRPr lang="en-US"/>
+          <a:p>
+            <a:r>
+              <a:rPr lang="en-US" dirty="0" err="1"/>
+              <a:t>Basiert</a:t>
+            </a:r>
+            <a:r>
+              <a:rPr lang="en-US" dirty="0"/>
+              <a:t> auf Node.js</a:t>
+            </a:r>
+          </a:p>
+          <a:p>
+            <a:endParaRPr lang="en-US" dirty="0"/>
+          </a:p>
+          <a:p>
+            <a:r>
+              <a:rPr lang="en-US" dirty="0"/>
+              <a:t>Gulp-Tasks </a:t>
+            </a:r>
+            <a:r>
+              <a:rPr lang="en-US" dirty="0" err="1"/>
+              <a:t>sind</a:t>
+            </a:r>
+            <a:r>
+              <a:rPr lang="en-US" dirty="0"/>
+              <a:t> </a:t>
+            </a:r>
+            <a:r>
+              <a:rPr lang="en-US" dirty="0" err="1"/>
+              <a:t>kleine</a:t>
+            </a:r>
+            <a:r>
+              <a:rPr lang="en-US" dirty="0"/>
+              <a:t>, </a:t>
+            </a:r>
+            <a:r>
+              <a:rPr lang="en-US" dirty="0" err="1"/>
+              <a:t>Eigentständige</a:t>
+            </a:r>
+            <a:r>
+              <a:rPr lang="en-US" dirty="0"/>
+              <a:t> JavaScript-</a:t>
+            </a:r>
+            <a:r>
+              <a:rPr lang="en-US" dirty="0" err="1"/>
+              <a:t>Funktionen</a:t>
+            </a:r>
+            <a:endParaRPr lang="en-US" dirty="0"/>
+          </a:p>
+          <a:p>
+            <a:endParaRPr lang="en-US" dirty="0"/>
+          </a:p>
+          <a:p>
+            <a:r>
+              <a:rPr lang="en-US" dirty="0" err="1"/>
+              <a:t>Erlaubt</a:t>
+            </a:r>
+            <a:r>
+              <a:rPr lang="en-US" dirty="0"/>
+              <a:t> </a:t>
+            </a:r>
+            <a:r>
+              <a:rPr lang="en-US" dirty="0" err="1"/>
+              <a:t>es</a:t>
+            </a:r>
+            <a:r>
+              <a:rPr lang="en-US" dirty="0"/>
+              <a:t>, </a:t>
+            </a:r>
+            <a:r>
+              <a:rPr lang="en-US" dirty="0" err="1"/>
+              <a:t>Aufgaben</a:t>
+            </a:r>
+            <a:r>
+              <a:rPr lang="en-US" dirty="0"/>
+              <a:t> </a:t>
+            </a:r>
+            <a:r>
+              <a:rPr lang="en-US" dirty="0" err="1"/>
+              <a:t>im</a:t>
+            </a:r>
+            <a:r>
+              <a:rPr lang="en-US" dirty="0"/>
+              <a:t> Build-</a:t>
+            </a:r>
+            <a:r>
+              <a:rPr lang="en-US" dirty="0" err="1"/>
+              <a:t>Prozess</a:t>
+            </a:r>
+            <a:r>
+              <a:rPr lang="en-US" dirty="0"/>
+              <a:t> </a:t>
+            </a:r>
+            <a:r>
+              <a:rPr lang="en-US" dirty="0" err="1"/>
+              <a:t>bequem</a:t>
+            </a:r>
+            <a:r>
+              <a:rPr lang="en-US" dirty="0"/>
+              <a:t> </a:t>
+            </a:r>
+            <a:r>
+              <a:rPr lang="en-US" dirty="0" err="1"/>
+              <a:t>zu</a:t>
+            </a:r>
+            <a:r>
+              <a:rPr lang="en-US" dirty="0"/>
+              <a:t> </a:t>
+            </a:r>
+            <a:r>
+              <a:rPr lang="en-US" dirty="0" err="1"/>
+              <a:t>automatisieren</a:t>
+            </a:r>
+            <a:endParaRPr lang="en-US" dirty="0"/>
+          </a:p>
+          <a:p>
+            <a:endParaRPr lang="en-US" dirty="0"/>
+          </a:p>
+          <a:p>
+            <a:endParaRPr lang="en-US" dirty="0"/>
           </a:p>
         </p:txBody>
       </p:sp>
@@ -4475,7 +4545,7 @@
           <a:lstStyle/>
           <a:p>
             <a:r>
-              <a:rPr lang="de-DE" smtClean="0"/>
+              <a:rPr lang="de-DE"/>
               <a:t>Thinktecture AG</a:t>
             </a:r>
             <a:endParaRPr lang="de-DE" dirty="0"/>
@@ -4551,10 +4621,9 @@
           <a:lstStyle/>
           <a:p>
             <a:r>
-              <a:rPr lang="en-US" dirty="0" smtClean="0"/>
+              <a:rPr lang="en-US" dirty="0"/>
               <a:t>Apache Cordova</a:t>
             </a:r>
-            <a:endParaRPr lang="en-US" dirty="0"/>
           </a:p>
         </p:txBody>
       </p:sp>
@@ -4624,6 +4693,9 @@
             <a:endParaRPr lang="en-US" dirty="0"/>
           </a:p>
           <a:p>
+            <a:endParaRPr lang="en-US" dirty="0"/>
+          </a:p>
+          <a:p>
             <a:r>
               <a:rPr lang="en-US" dirty="0" err="1"/>
               <a:t>Erweiterbar</a:t>
@@ -4642,6 +4714,9 @@
             </a:r>
           </a:p>
           <a:p>
+            <a:endParaRPr lang="en-US" dirty="0"/>
+          </a:p>
+          <a:p>
             <a:r>
               <a:rPr lang="en-US" dirty="0" err="1"/>
               <a:t>Ermöglicht</a:t>
@@ -4688,7 +4763,7 @@
           <a:lstStyle/>
           <a:p>
             <a:r>
-              <a:rPr lang="de-DE" smtClean="0"/>
+              <a:rPr lang="de-DE"/>
               <a:t>Thinktecture AG</a:t>
             </a:r>
             <a:endParaRPr lang="de-DE" dirty="0"/>
@@ -4764,14 +4839,13 @@
           <a:lstStyle/>
           <a:p>
             <a:r>
-              <a:rPr lang="en-US" dirty="0" err="1" smtClean="0"/>
+              <a:rPr lang="en-US" dirty="0" err="1"/>
               <a:t>Fragen</a:t>
             </a:r>
             <a:r>
-              <a:rPr lang="en-US" dirty="0" smtClean="0"/>
+              <a:rPr lang="en-US" dirty="0"/>
               <a:t>?</a:t>
             </a:r>
-            <a:endParaRPr lang="en-US" dirty="0"/>
           </a:p>
         </p:txBody>
       </p:sp>
@@ -4791,14 +4865,13 @@
           <a:lstStyle/>
           <a:p>
             <a:r>
-              <a:rPr lang="en-US" dirty="0" err="1" smtClean="0"/>
+              <a:rPr lang="en-US" dirty="0" err="1"/>
               <a:t>Antworten</a:t>
             </a:r>
             <a:r>
-              <a:rPr lang="en-US" dirty="0" smtClean="0"/>
+              <a:rPr lang="en-US" dirty="0"/>
               <a:t>!</a:t>
             </a:r>
-            <a:endParaRPr lang="en-US" dirty="0"/>
           </a:p>
         </p:txBody>
       </p:sp>
@@ -4848,14 +4921,13 @@
           <a:lstStyle/>
           <a:p>
             <a:r>
-              <a:rPr lang="en-US" dirty="0" err="1" smtClean="0"/>
+              <a:rPr lang="en-US" dirty="0" err="1"/>
               <a:t>Quellen</a:t>
             </a:r>
             <a:r>
-              <a:rPr lang="en-US" dirty="0" smtClean="0"/>
+              <a:rPr lang="en-US" dirty="0"/>
               <a:t>/Links</a:t>
             </a:r>
-            <a:endParaRPr lang="en-US" dirty="0"/>
           </a:p>
         </p:txBody>
       </p:sp>
@@ -4894,7 +4966,7 @@
           <a:lstStyle/>
           <a:p>
             <a:r>
-              <a:rPr lang="de-DE" smtClean="0"/>
+              <a:rPr lang="de-DE"/>
               <a:t>Thinktecture AG</a:t>
             </a:r>
             <a:endParaRPr lang="de-DE" dirty="0"/>
@@ -4970,10 +5042,9 @@
           <a:lstStyle/>
           <a:p>
             <a:r>
-              <a:rPr lang="en-US" dirty="0" smtClean="0"/>
+              <a:rPr lang="en-US" dirty="0"/>
               <a:t>Speaker</a:t>
             </a:r>
-            <a:endParaRPr lang="en-US" dirty="0"/>
           </a:p>
         </p:txBody>
       </p:sp>
@@ -5010,7 +5081,7 @@
               <a:defRPr/>
             </a:pPr>
             <a:r>
-              <a:rPr lang="en-US" b="1" dirty="0" smtClean="0"/>
+              <a:rPr lang="en-US" b="1" dirty="0"/>
               <a:t>Steffen Jahr</a:t>
             </a:r>
           </a:p>
@@ -5033,7 +5104,7 @@
               <a:defRPr/>
             </a:pPr>
             <a:r>
-              <a:rPr lang="en-US" dirty="0" smtClean="0"/>
+              <a:rPr lang="en-US" dirty="0"/>
               <a:t>Software Developer</a:t>
             </a:r>
           </a:p>
@@ -5076,11 +5147,11 @@
               <a:defRPr/>
             </a:pPr>
             <a:r>
-              <a:rPr lang="en-US" dirty="0" err="1" smtClean="0"/>
+              <a:rPr lang="en-US" dirty="0" err="1"/>
               <a:t>Fokus</a:t>
             </a:r>
             <a:r>
-              <a:rPr lang="en-US" dirty="0" smtClean="0"/>
+              <a:rPr lang="en-US" dirty="0"/>
               <a:t>:</a:t>
             </a:r>
           </a:p>
@@ -5103,7 +5174,7 @@
               <a:defRPr/>
             </a:pPr>
             <a:r>
-              <a:rPr lang="en-US" dirty="0" smtClean="0"/>
+              <a:rPr lang="en-US" dirty="0"/>
               <a:t>Frontend</a:t>
             </a:r>
           </a:p>
@@ -5126,7 +5197,7 @@
               <a:defRPr/>
             </a:pPr>
             <a:r>
-              <a:rPr lang="en-US" dirty="0" smtClean="0"/>
+              <a:rPr lang="en-US" dirty="0"/>
               <a:t>Angular</a:t>
             </a:r>
           </a:p>
@@ -5149,8 +5220,54 @@
               <a:defRPr/>
             </a:pPr>
             <a:r>
-              <a:rPr lang="en-US" dirty="0" smtClean="0"/>
+              <a:rPr lang="en-US" dirty="0"/>
               <a:t>Apache Cordova</a:t>
+            </a:r>
+          </a:p>
+          <a:p>
+            <a:pPr marR="0" lvl="0" defTabSz="914400" eaLnBrk="1" fontAlgn="auto" latinLnBrk="0" hangingPunct="1">
+              <a:lnSpc>
+                <a:spcPct val="100000"/>
+              </a:lnSpc>
+              <a:spcBef>
+                <a:spcPts val="0"/>
+              </a:spcBef>
+              <a:spcAft>
+                <a:spcPts val="0"/>
+              </a:spcAft>
+              <a:buClrTx/>
+              <a:buSzTx/>
+              <a:buFontTx/>
+              <a:buChar char="-"/>
+              <a:tabLst/>
+              <a:defRPr/>
+            </a:pPr>
+            <a:endParaRPr lang="en-US" dirty="0"/>
+          </a:p>
+          <a:p>
+            <a:pPr marL="0" marR="0" lvl="0" indent="0" defTabSz="914400" eaLnBrk="1" fontAlgn="auto" latinLnBrk="0" hangingPunct="1">
+              <a:lnSpc>
+                <a:spcPct val="100000"/>
+              </a:lnSpc>
+              <a:spcBef>
+                <a:spcPts val="0"/>
+              </a:spcBef>
+              <a:spcAft>
+                <a:spcPts val="0"/>
+              </a:spcAft>
+              <a:buClrTx/>
+              <a:buSzTx/>
+              <a:buNone/>
+              <a:tabLst/>
+              <a:defRPr/>
+            </a:pPr>
+            <a:r>
+              <a:rPr lang="en-US" dirty="0"/>
+              <a:t>Twitter:      @</a:t>
+            </a:r>
+            <a:r>
+              <a:rPr lang="en-US" dirty="0" err="1"/>
+              <a:t>SteffenJahr</a:t>
             </a:r>
             <a:endParaRPr lang="en-US" dirty="0"/>
           </a:p>
@@ -5194,11 +5311,11 @@
               <a:defRPr/>
             </a:pPr>
             <a:r>
-              <a:rPr lang="en-US" b="1" dirty="0" smtClean="0"/>
+              <a:rPr lang="en-US" b="1" dirty="0"/>
               <a:t>Sebastian P.R. </a:t>
             </a:r>
             <a:r>
-              <a:rPr lang="en-US" b="1" dirty="0" err="1" smtClean="0"/>
+              <a:rPr lang="en-US" b="1" dirty="0" err="1"/>
               <a:t>Gingter</a:t>
             </a:r>
             <a:endParaRPr lang="en-US" b="1" dirty="0"/>
@@ -5222,143 +5339,9 @@
               <a:defRPr/>
             </a:pPr>
             <a:r>
-              <a:rPr lang="en-US" dirty="0" smtClean="0"/>
+              <a:rPr lang="en-US" dirty="0"/>
               <a:t>Software Engineer</a:t>
             </a:r>
-          </a:p>
-          <a:p>
-            <a:pPr marL="0" marR="0" lvl="0" indent="0" defTabSz="914400" eaLnBrk="1" fontAlgn="auto" latinLnBrk="0" hangingPunct="1">
-              <a:lnSpc>
-                <a:spcPct val="100000"/>
-              </a:lnSpc>
-              <a:spcBef>
-                <a:spcPts val="0"/>
-              </a:spcBef>
-              <a:spcAft>
-                <a:spcPts val="0"/>
-              </a:spcAft>
-              <a:buClrTx/>
-              <a:buSzTx/>
-              <a:buFontTx/>
-              <a:buNone/>
-              <a:tabLst/>
-              <a:defRPr/>
-            </a:pPr>
-            <a:endParaRPr lang="en-US" dirty="0" smtClean="0"/>
-          </a:p>
-          <a:p>
-            <a:pPr marL="0" marR="0" lvl="0" indent="0" defTabSz="914400" eaLnBrk="1" fontAlgn="auto" latinLnBrk="0" hangingPunct="1">
-              <a:lnSpc>
-                <a:spcPct val="100000"/>
-              </a:lnSpc>
-              <a:spcBef>
-                <a:spcPts val="0"/>
-              </a:spcBef>
-              <a:spcAft>
-                <a:spcPts val="0"/>
-              </a:spcAft>
-              <a:buClrTx/>
-              <a:buSzTx/>
-              <a:buFontTx/>
-              <a:buNone/>
-              <a:tabLst/>
-              <a:defRPr/>
-            </a:pPr>
-            <a:r>
-              <a:rPr lang="en-US" dirty="0" smtClean="0"/>
-              <a:t>		</a:t>
-            </a:r>
-            <a:r>
-              <a:rPr lang="en-US" dirty="0" err="1" smtClean="0"/>
-              <a:t>Fokus</a:t>
-            </a:r>
-            <a:r>
-              <a:rPr lang="en-US" dirty="0" smtClean="0"/>
-              <a:t>:</a:t>
-            </a:r>
-          </a:p>
-          <a:p>
-            <a:pPr marL="0" marR="0" lvl="0" indent="0" defTabSz="914400" eaLnBrk="1" fontAlgn="auto" latinLnBrk="0" hangingPunct="1">
-              <a:lnSpc>
-                <a:spcPct val="100000"/>
-              </a:lnSpc>
-              <a:spcBef>
-                <a:spcPts val="0"/>
-              </a:spcBef>
-              <a:spcAft>
-                <a:spcPts val="0"/>
-              </a:spcAft>
-              <a:buClrTx/>
-              <a:buSzTx/>
-              <a:buFontTx/>
-              <a:buNone/>
-              <a:tabLst/>
-              <a:defRPr/>
-            </a:pPr>
-            <a:r>
-              <a:rPr lang="en-US" dirty="0" smtClean="0"/>
-              <a:t>		- Backend</a:t>
-            </a:r>
-          </a:p>
-          <a:p>
-            <a:pPr marL="0" marR="0" lvl="0" indent="0" defTabSz="914400" eaLnBrk="1" fontAlgn="auto" latinLnBrk="0" hangingPunct="1">
-              <a:lnSpc>
-                <a:spcPct val="100000"/>
-              </a:lnSpc>
-              <a:spcBef>
-                <a:spcPts val="0"/>
-              </a:spcBef>
-              <a:spcAft>
-                <a:spcPts val="0"/>
-              </a:spcAft>
-              <a:buClrTx/>
-              <a:buSzTx/>
-              <a:buFontTx/>
-              <a:buNone/>
-              <a:tabLst/>
-              <a:defRPr/>
-            </a:pPr>
-            <a:r>
-              <a:rPr lang="en-US" dirty="0"/>
-              <a:t>	</a:t>
-            </a:r>
-            <a:r>
-              <a:rPr lang="en-US" dirty="0" smtClean="0"/>
-              <a:t>	- </a:t>
-            </a:r>
-            <a:r>
-              <a:rPr lang="en-US" dirty="0" err="1" smtClean="0"/>
-              <a:t>TypeScript</a:t>
-            </a:r>
-            <a:endParaRPr lang="en-US" dirty="0" smtClean="0"/>
-          </a:p>
-          <a:p>
-            <a:pPr marL="0" marR="0" lvl="0" indent="0" defTabSz="914400" eaLnBrk="1" fontAlgn="auto" latinLnBrk="0" hangingPunct="1">
-              <a:lnSpc>
-                <a:spcPct val="100000"/>
-              </a:lnSpc>
-              <a:spcBef>
-                <a:spcPts val="0"/>
-              </a:spcBef>
-              <a:spcAft>
-                <a:spcPts val="0"/>
-              </a:spcAft>
-              <a:buClrTx/>
-              <a:buSzTx/>
-              <a:buFontTx/>
-              <a:buNone/>
-              <a:tabLst/>
-              <a:defRPr/>
-            </a:pPr>
-            <a:r>
-              <a:rPr lang="en-US" dirty="0"/>
-              <a:t>	 </a:t>
-            </a:r>
-            <a:r>
-              <a:rPr lang="en-US" dirty="0" smtClean="0"/>
-              <a:t>     	- C# / .NET Core</a:t>
-            </a:r>
-            <a:endParaRPr lang="en-US" dirty="0"/>
           </a:p>
           <a:p>
             <a:pPr marL="0" marR="0" lvl="0" indent="0" defTabSz="914400" eaLnBrk="1" fontAlgn="auto" latinLnBrk="0" hangingPunct="1">
@@ -5380,6 +5363,146 @@
             </a:pPr>
             <a:endParaRPr lang="en-US" dirty="0"/>
           </a:p>
+          <a:p>
+            <a:pPr marL="0" marR="0" lvl="0" indent="0" defTabSz="914400" eaLnBrk="1" fontAlgn="auto" latinLnBrk="0" hangingPunct="1">
+              <a:lnSpc>
+                <a:spcPct val="100000"/>
+              </a:lnSpc>
+              <a:spcBef>
+                <a:spcPts val="0"/>
+              </a:spcBef>
+              <a:spcAft>
+                <a:spcPts val="0"/>
+              </a:spcAft>
+              <a:buClrTx/>
+              <a:buSzTx/>
+              <a:buFontTx/>
+              <a:buNone/>
+              <a:tabLst/>
+              <a:defRPr/>
+            </a:pPr>
+            <a:r>
+              <a:rPr lang="en-US" dirty="0"/>
+              <a:t>		</a:t>
+            </a:r>
+            <a:r>
+              <a:rPr lang="en-US" dirty="0" err="1"/>
+              <a:t>Fokus</a:t>
+            </a:r>
+            <a:r>
+              <a:rPr lang="en-US" dirty="0"/>
+              <a:t>:</a:t>
+            </a:r>
+          </a:p>
+          <a:p>
+            <a:pPr marL="0" marR="0" lvl="0" indent="0" defTabSz="914400" eaLnBrk="1" fontAlgn="auto" latinLnBrk="0" hangingPunct="1">
+              <a:lnSpc>
+                <a:spcPct val="100000"/>
+              </a:lnSpc>
+              <a:spcBef>
+                <a:spcPts val="0"/>
+              </a:spcBef>
+              <a:spcAft>
+                <a:spcPts val="0"/>
+              </a:spcAft>
+              <a:buClrTx/>
+              <a:buSzTx/>
+              <a:buFontTx/>
+              <a:buNone/>
+              <a:tabLst/>
+              <a:defRPr/>
+            </a:pPr>
+            <a:r>
+              <a:rPr lang="en-US" dirty="0"/>
+              <a:t>		- Backend</a:t>
+            </a:r>
+          </a:p>
+          <a:p>
+            <a:pPr marL="0" marR="0" lvl="0" indent="0" defTabSz="914400" eaLnBrk="1" fontAlgn="auto" latinLnBrk="0" hangingPunct="1">
+              <a:lnSpc>
+                <a:spcPct val="100000"/>
+              </a:lnSpc>
+              <a:spcBef>
+                <a:spcPts val="0"/>
+              </a:spcBef>
+              <a:spcAft>
+                <a:spcPts val="0"/>
+              </a:spcAft>
+              <a:buClrTx/>
+              <a:buSzTx/>
+              <a:buFontTx/>
+              <a:buNone/>
+              <a:tabLst/>
+              <a:defRPr/>
+            </a:pPr>
+            <a:r>
+              <a:rPr lang="en-US" dirty="0"/>
+              <a:t>		- </a:t>
+            </a:r>
+            <a:r>
+              <a:rPr lang="en-US" dirty="0" err="1"/>
+              <a:t>TypeScript</a:t>
+            </a:r>
+            <a:endParaRPr lang="en-US" dirty="0"/>
+          </a:p>
+          <a:p>
+            <a:pPr marL="0" marR="0" lvl="0" indent="0" defTabSz="914400" eaLnBrk="1" fontAlgn="auto" latinLnBrk="0" hangingPunct="1">
+              <a:lnSpc>
+                <a:spcPct val="100000"/>
+              </a:lnSpc>
+              <a:spcBef>
+                <a:spcPts val="0"/>
+              </a:spcBef>
+              <a:spcAft>
+                <a:spcPts val="0"/>
+              </a:spcAft>
+              <a:buClrTx/>
+              <a:buSzTx/>
+              <a:buFontTx/>
+              <a:buNone/>
+              <a:tabLst/>
+              <a:defRPr/>
+            </a:pPr>
+            <a:r>
+              <a:rPr lang="en-US" dirty="0"/>
+              <a:t>	      	- C# / .NET Core</a:t>
+            </a:r>
+            <a:br>
+              <a:rPr lang="en-US" dirty="0"/>
+            </a:br>
+            <a:br>
+              <a:rPr lang="en-US" dirty="0"/>
+            </a:br>
+            <a:r>
+              <a:rPr lang="en-US" dirty="0"/>
+              <a:t>	@</a:t>
+            </a:r>
+            <a:r>
+              <a:rPr lang="en-US" dirty="0" err="1"/>
+              <a:t>PhoenixHawk</a:t>
+            </a:r>
+            <a:endParaRPr lang="en-US" dirty="0"/>
+          </a:p>
+          <a:p>
+            <a:pPr marL="0" marR="0" lvl="0" indent="0" defTabSz="914400" eaLnBrk="1" fontAlgn="auto" latinLnBrk="0" hangingPunct="1">
+              <a:lnSpc>
+                <a:spcPct val="100000"/>
+              </a:lnSpc>
+              <a:spcBef>
+                <a:spcPts val="0"/>
+              </a:spcBef>
+              <a:spcAft>
+                <a:spcPts val="0"/>
+              </a:spcAft>
+              <a:buClrTx/>
+              <a:buSzTx/>
+              <a:buFontTx/>
+              <a:buNone/>
+              <a:tabLst/>
+              <a:defRPr/>
+            </a:pPr>
+            <a:endParaRPr lang="en-US" dirty="0"/>
+          </a:p>
         </p:txBody>
       </p:sp>
       <p:sp>
@@ -5398,7 +5521,7 @@
           <a:lstStyle/>
           <a:p>
             <a:r>
-              <a:rPr lang="de-DE" smtClean="0"/>
+              <a:rPr lang="de-DE"/>
               <a:t>Thinktecture AG</a:t>
             </a:r>
             <a:endParaRPr lang="de-DE" dirty="0"/>
@@ -5428,30 +5551,6 @@
           </a:p>
         </p:txBody>
       </p:sp>
-      <p:pic>
-        <p:nvPicPr>
-          <p:cNvPr id="10" name="Picture 9"/>
-          <p:cNvPicPr>
-            <a:picLocks noChangeAspect="1"/>
-          </p:cNvPicPr>
-          <p:nvPr/>
-        </p:nvPicPr>
-        <p:blipFill>
-          <a:blip r:embed="rId2"/>
-          <a:stretch>
-            <a:fillRect/>
-          </a:stretch>
-        </p:blipFill>
-        <p:spPr>
-          <a:xfrm>
-            <a:off x="4237112" y="2906052"/>
-            <a:ext cx="1357630" cy="1914258"/>
-          </a:xfrm>
-          <a:prstGeom prst="rect">
-            <a:avLst/>
-          </a:prstGeom>
-        </p:spPr>
-      </p:pic>
     </p:spTree>
     <p:extLst>
       <p:ext uri="{BB962C8B-B14F-4D97-AF65-F5344CB8AC3E}">
@@ -5462,13 +5561,6 @@
   <p:clrMapOvr>
     <a:masterClrMapping/>
   </p:clrMapOvr>
-  <p:timing>
-    <p:tnLst>
-      <p:par>
-        <p:cTn id="1" dur="indefinite" restart="never" nodeType="tmRoot"/>
-      </p:par>
-    </p:tnLst>
-  </p:timing>
 </p:sld>
 </file>
 
@@ -5505,10 +5597,9 @@
           <a:lstStyle/>
           <a:p>
             <a:r>
-              <a:rPr lang="en-US" dirty="0" smtClean="0"/>
+              <a:rPr lang="en-US" dirty="0"/>
               <a:t>Apps should run on any device and platform</a:t>
             </a:r>
-            <a:endParaRPr lang="en-US" dirty="0"/>
           </a:p>
         </p:txBody>
       </p:sp>
@@ -5528,10 +5619,9 @@
           <a:lstStyle/>
           <a:p>
             <a:r>
-              <a:rPr lang="en-US" dirty="0" smtClean="0"/>
+              <a:rPr lang="en-US" dirty="0"/>
               <a:t>Thinktecture AG</a:t>
             </a:r>
-            <a:endParaRPr lang="en-US" dirty="0"/>
           </a:p>
         </p:txBody>
       </p:sp>
@@ -5581,14 +5671,11 @@
           <a:lstStyle/>
           <a:p>
             <a:r>
-              <a:rPr lang="en-US" dirty="0" smtClean="0">
+              <a:rPr lang="en-US" dirty="0">
                 <a:latin typeface="Textra LT Book" panose="02000503080000020004" pitchFamily="2" charset="0"/>
               </a:rPr>
               <a:t>Support all devices</a:t>
             </a:r>
-            <a:endParaRPr lang="en-US" dirty="0">
-              <a:latin typeface="Textra LT Book" panose="02000503080000020004" pitchFamily="2" charset="0"/>
-            </a:endParaRPr>
           </a:p>
         </p:txBody>
       </p:sp>
@@ -5615,14 +5702,11 @@
           <a:lstStyle/>
           <a:p>
             <a:r>
-              <a:rPr lang="en-US" dirty="0" smtClean="0">
+              <a:rPr lang="en-US" dirty="0">
                 <a:latin typeface="Textra LT Book" panose="02000503080000020004" pitchFamily="2" charset="0"/>
               </a:rPr>
               <a:t>Support any platform</a:t>
             </a:r>
-            <a:endParaRPr lang="en-US" dirty="0">
-              <a:latin typeface="Textra LT Book" panose="02000503080000020004" pitchFamily="2" charset="0"/>
-            </a:endParaRPr>
           </a:p>
         </p:txBody>
       </p:sp>
@@ -5649,14 +5733,11 @@
           <a:lstStyle/>
           <a:p>
             <a:r>
-              <a:rPr lang="en-US" dirty="0" smtClean="0">
+              <a:rPr lang="en-US" dirty="0">
                 <a:latin typeface="Textra LT Book" panose="02000503080000020004" pitchFamily="2" charset="0"/>
               </a:rPr>
               <a:t>Support apps and websites</a:t>
             </a:r>
-            <a:endParaRPr lang="en-US" dirty="0">
-              <a:latin typeface="Textra LT Book" panose="02000503080000020004" pitchFamily="2" charset="0"/>
-            </a:endParaRPr>
           </a:p>
         </p:txBody>
       </p:sp>
@@ -5686,7 +5767,7 @@
           <a:p>
             <a:pPr algn="ctr"/>
             <a:r>
-              <a:rPr lang="en-US" sz="2800" dirty="0" smtClean="0">
+              <a:rPr lang="en-US" sz="2800" dirty="0">
                 <a:solidFill>
                   <a:schemeClr val="bg1"/>
                 </a:solidFill>
@@ -5694,12 +5775,6 @@
               </a:rPr>
               <a:t>Multi platform + multi channel approach</a:t>
             </a:r>
-            <a:endParaRPr lang="en-US" sz="2800" dirty="0">
-              <a:solidFill>
-                <a:schemeClr val="bg1"/>
-              </a:solidFill>
-              <a:latin typeface="Textra LT Book" panose="02000503080000020004" pitchFamily="2" charset="0"/>
-            </a:endParaRPr>
           </a:p>
         </p:txBody>
       </p:sp>
@@ -6414,7 +6489,7 @@
               <a:lstStyle/>
               <a:p>
                 <a:r>
-                  <a:rPr lang="en-US" sz="600" dirty="0" smtClean="0">
+                  <a:rPr lang="en-US" sz="600" dirty="0">
                     <a:solidFill>
                       <a:schemeClr val="bg1">
                         <a:lumMod val="50000"/>
@@ -6558,7 +6633,7 @@
               <a:lstStyle/>
               <a:p>
                 <a:r>
-                  <a:rPr lang="en-US" sz="600" dirty="0" smtClean="0">
+                  <a:rPr lang="en-US" sz="600" dirty="0">
                     <a:solidFill>
                       <a:schemeClr val="bg1">
                         <a:lumMod val="50000"/>
@@ -7054,7 +7129,7 @@
           <a:lstStyle/>
           <a:p>
             <a:r>
-              <a:rPr lang="en-US" dirty="0" smtClean="0">
+              <a:rPr lang="en-US" dirty="0">
                 <a:solidFill>
                   <a:schemeClr val="accent6"/>
                 </a:solidFill>
@@ -7064,14 +7139,6 @@
               </a:rPr>
               <a:t>Including websites + browsers!</a:t>
             </a:r>
-            <a:endParaRPr lang="en-US" dirty="0">
-              <a:solidFill>
-                <a:schemeClr val="accent6"/>
-              </a:solidFill>
-              <a:latin typeface="Chalkduster" charset="0"/>
-              <a:ea typeface="Chalkduster" charset="0"/>
-              <a:cs typeface="Chalkduster" charset="0"/>
-            </a:endParaRPr>
           </a:p>
         </p:txBody>
       </p:sp>
@@ -7085,13 +7152,6 @@
   <p:clrMapOvr>
     <a:masterClrMapping/>
   </p:clrMapOvr>
-  <p:timing>
-    <p:tnLst>
-      <p:par>
-        <p:cTn id="1" dur="indefinite" restart="never" nodeType="tmRoot"/>
-      </p:par>
-    </p:tnLst>
-  </p:timing>
 </p:sld>
 </file>
 
@@ -7128,10 +7188,9 @@
           <a:lstStyle/>
           <a:p>
             <a:r>
-              <a:rPr lang="en-US" dirty="0" smtClean="0"/>
+              <a:rPr lang="en-US" dirty="0"/>
               <a:t>Agenda</a:t>
             </a:r>
-            <a:endParaRPr lang="en-US" dirty="0"/>
           </a:p>
         </p:txBody>
       </p:sp>
@@ -7153,28 +7212,27 @@
           <a:lstStyle/>
           <a:p>
             <a:r>
-              <a:rPr lang="en-US" sz="3200" dirty="0" smtClean="0"/>
+              <a:rPr lang="en-US" sz="3200" dirty="0"/>
               <a:t>Block 1: Intro &amp; Setup</a:t>
             </a:r>
           </a:p>
           <a:p>
             <a:r>
-              <a:rPr lang="en-US" sz="3200" dirty="0" smtClean="0"/>
+              <a:rPr lang="en-US" sz="3200" dirty="0"/>
               <a:t>Block 2: Angular</a:t>
             </a:r>
           </a:p>
           <a:p>
             <a:r>
-              <a:rPr lang="en-US" sz="3200" dirty="0" smtClean="0"/>
+              <a:rPr lang="en-US" sz="3200" dirty="0"/>
               <a:t>Block 3: Angular &amp; Cordova</a:t>
             </a:r>
           </a:p>
           <a:p>
             <a:r>
-              <a:rPr lang="en-US" sz="3200" dirty="0" smtClean="0"/>
+              <a:rPr lang="en-US" sz="3200" dirty="0"/>
               <a:t>Block 4: Cordova &amp; FAQ</a:t>
             </a:r>
-            <a:endParaRPr lang="en-US" sz="3200" dirty="0"/>
           </a:p>
         </p:txBody>
       </p:sp>
@@ -7194,7 +7252,7 @@
           <a:lstStyle/>
           <a:p>
             <a:r>
-              <a:rPr lang="de-DE" smtClean="0"/>
+              <a:rPr lang="de-DE"/>
               <a:t>Thinktecture AG</a:t>
             </a:r>
             <a:endParaRPr lang="de-DE" dirty="0"/>
@@ -7270,10 +7328,9 @@
           <a:lstStyle/>
           <a:p>
             <a:r>
-              <a:rPr lang="en-US" dirty="0" smtClean="0"/>
+              <a:rPr lang="en-US" dirty="0"/>
               <a:t>Intro</a:t>
             </a:r>
-            <a:endParaRPr lang="en-US" dirty="0"/>
           </a:p>
         </p:txBody>
       </p:sp>
@@ -7293,34 +7350,33 @@
           <a:lstStyle/>
           <a:p>
             <a:r>
-              <a:rPr lang="en-US" dirty="0" smtClean="0"/>
+              <a:rPr lang="en-US" dirty="0"/>
               <a:t>Was </a:t>
             </a:r>
             <a:r>
-              <a:rPr lang="en-US" dirty="0" err="1" smtClean="0"/>
+              <a:rPr lang="en-US" dirty="0" err="1"/>
               <a:t>haben</a:t>
             </a:r>
             <a:r>
-              <a:rPr lang="en-US" dirty="0" smtClean="0"/>
+              <a:rPr lang="en-US" dirty="0"/>
               <a:t> </a:t>
             </a:r>
             <a:r>
-              <a:rPr lang="en-US" dirty="0" err="1" smtClean="0"/>
+              <a:rPr lang="en-US" dirty="0" err="1"/>
               <a:t>wir</a:t>
             </a:r>
             <a:r>
-              <a:rPr lang="en-US" dirty="0" smtClean="0"/>
+              <a:rPr lang="en-US" dirty="0"/>
               <a:t> </a:t>
             </a:r>
             <a:r>
-              <a:rPr lang="en-US" dirty="0" err="1" smtClean="0"/>
+              <a:rPr lang="en-US" dirty="0" err="1"/>
               <a:t>vor</a:t>
             </a:r>
             <a:r>
-              <a:rPr lang="en-US" dirty="0" smtClean="0"/>
+              <a:rPr lang="en-US" dirty="0"/>
               <a:t>?</a:t>
             </a:r>
-            <a:endParaRPr lang="en-US" dirty="0"/>
           </a:p>
         </p:txBody>
       </p:sp>
@@ -7340,7 +7396,7 @@
           <a:lstStyle/>
           <a:p>
             <a:r>
-              <a:rPr lang="de-DE" smtClean="0"/>
+              <a:rPr lang="de-DE"/>
               <a:t>Thinktecture AG</a:t>
             </a:r>
             <a:endParaRPr lang="de-DE" dirty="0"/>
@@ -7416,10 +7472,9 @@
           <a:lstStyle/>
           <a:p>
             <a:r>
-              <a:rPr lang="en-US" dirty="0" smtClean="0"/>
+              <a:rPr lang="en-US" dirty="0"/>
               <a:t>Setup</a:t>
             </a:r>
-            <a:endParaRPr lang="en-US" dirty="0"/>
           </a:p>
         </p:txBody>
       </p:sp>
@@ -7446,39 +7501,20 @@
               <a:rPr lang="de-DE" dirty="0"/>
             </a:br>
             <a:r>
-              <a:rPr lang="de-DE" dirty="0"/>
-              <a:t>https://</a:t>
-            </a:r>
-            <a:r>
-              <a:rPr lang="de-DE" dirty="0" err="1"/>
-              <a:t>github.com</a:t>
-            </a:r>
-            <a:r>
-              <a:rPr lang="de-DE" dirty="0"/>
-              <a:t>/</a:t>
-            </a:r>
-            <a:r>
-              <a:rPr lang="de-DE" dirty="0" err="1"/>
-              <a:t>thinktecture</a:t>
-            </a:r>
-            <a:r>
-              <a:rPr lang="de-DE" dirty="0"/>
-              <a:t>/</a:t>
-            </a:r>
-            <a:br>
-              <a:rPr lang="de-DE" dirty="0"/>
-            </a:br>
-            <a:r>
-              <a:rPr lang="de-DE" dirty="0"/>
-              <a:t>	hackschool-</a:t>
-            </a:r>
-            <a:r>
-              <a:rPr lang="de-DE" dirty="0" err="1"/>
-              <a:t>crossplatform</a:t>
+              <a:rPr lang="de-DE" dirty="0">
+                <a:hlinkClick r:id="rId2"/>
+              </a:rPr>
+              <a:t>https://github.com/thinktecture/hackschool-crossplatform</a:t>
             </a:r>
             <a:endParaRPr lang="de-DE" dirty="0"/>
           </a:p>
           <a:p>
+            <a:endParaRPr lang="de-DE" dirty="0"/>
+          </a:p>
+          <a:p>
+            <a:endParaRPr lang="de-DE" dirty="0"/>
+          </a:p>
+          <a:p>
             <a:endParaRPr lang="en-US" dirty="0"/>
           </a:p>
         </p:txBody>
@@ -7499,7 +7535,7 @@
           <a:lstStyle/>
           <a:p>
             <a:r>
-              <a:rPr lang="de-DE" smtClean="0"/>
+              <a:rPr lang="de-DE"/>
               <a:t>Thinktecture AG</a:t>
             </a:r>
             <a:endParaRPr lang="de-DE" dirty="0"/>
@@ -7575,95 +7611,113 @@
           <a:lstStyle/>
           <a:p>
             <a:r>
-              <a:rPr lang="en-US" dirty="0" smtClean="0"/>
+              <a:rPr lang="en-US" dirty="0"/>
               <a:t>API</a:t>
             </a:r>
+          </a:p>
+        </p:txBody>
+      </p:sp>
+      <p:sp>
+        <p:nvSpPr>
+          <p:cNvPr id="3" name="Content Placeholder 2"/>
+          <p:cNvSpPr>
+            <a:spLocks noGrp="1"/>
+          </p:cNvSpPr>
+          <p:nvPr>
+            <p:ph idx="1"/>
+          </p:nvPr>
+        </p:nvSpPr>
+        <p:spPr/>
+        <p:txBody>
+          <a:bodyPr/>
+          <a:lstStyle/>
+          <a:p>
+            <a:r>
+              <a:rPr lang="en-US" dirty="0"/>
+              <a:t>Mini Pokémon API</a:t>
+            </a:r>
+          </a:p>
+          <a:p>
             <a:endParaRPr lang="en-US" dirty="0"/>
           </a:p>
-        </p:txBody>
-      </p:sp>
-      <p:sp>
-        <p:nvSpPr>
-          <p:cNvPr id="3" name="Content Placeholder 2"/>
-          <p:cNvSpPr>
-            <a:spLocks noGrp="1"/>
-          </p:cNvSpPr>
-          <p:nvPr>
-            <p:ph idx="1"/>
-          </p:nvPr>
-        </p:nvSpPr>
-        <p:spPr/>
-        <p:txBody>
-          <a:bodyPr/>
-          <a:lstStyle/>
-          <a:p>
-            <a:r>
-              <a:rPr lang="en-US" dirty="0" smtClean="0"/>
-              <a:t>Mini Pokémon API</a:t>
-            </a:r>
-          </a:p>
-          <a:p>
+          <a:p>
+            <a:r>
+              <a:rPr lang="en-US" dirty="0" err="1"/>
+              <a:t>Im</a:t>
+            </a:r>
+            <a:r>
+              <a:rPr lang="en-US" dirty="0"/>
+              <a:t> </a:t>
+            </a:r>
+            <a:r>
+              <a:rPr lang="en-US" dirty="0" err="1"/>
+              <a:t>Ordner</a:t>
+            </a:r>
+            <a:r>
+              <a:rPr lang="en-US" dirty="0"/>
+              <a:t> </a:t>
+            </a:r>
+            <a:r>
+              <a:rPr lang="en-US" i="1" dirty="0" err="1"/>
+              <a:t>api</a:t>
+            </a:r>
+            <a:endParaRPr lang="en-US" i="1" dirty="0"/>
+          </a:p>
+          <a:p>
+            <a:pPr lvl="1"/>
+            <a:r>
+              <a:rPr lang="en-US" dirty="0" err="1"/>
+              <a:t>npm</a:t>
+            </a:r>
+            <a:r>
+              <a:rPr lang="en-US" dirty="0"/>
+              <a:t> </a:t>
+            </a:r>
+            <a:r>
+              <a:rPr lang="en-US" dirty="0" err="1"/>
+              <a:t>i</a:t>
+            </a:r>
             <a:endParaRPr lang="en-US" dirty="0"/>
           </a:p>
           <a:p>
-            <a:r>
-              <a:rPr lang="en-US" dirty="0" err="1" smtClean="0"/>
-              <a:t>Im</a:t>
-            </a:r>
-            <a:r>
-              <a:rPr lang="en-US" dirty="0" smtClean="0"/>
-              <a:t> </a:t>
-            </a:r>
-            <a:r>
-              <a:rPr lang="en-US" dirty="0" err="1" smtClean="0"/>
-              <a:t>Ordner</a:t>
-            </a:r>
-            <a:r>
-              <a:rPr lang="en-US" dirty="0" smtClean="0"/>
-              <a:t> </a:t>
-            </a:r>
-            <a:r>
-              <a:rPr lang="en-US" i="1" dirty="0" err="1" smtClean="0"/>
-              <a:t>api</a:t>
-            </a:r>
-            <a:endParaRPr lang="en-US" i="1" dirty="0" smtClean="0"/>
-          </a:p>
-          <a:p>
             <a:pPr lvl="1"/>
             <a:r>
               <a:rPr lang="en-US" dirty="0" err="1"/>
-              <a:t>n</a:t>
-            </a:r>
-            <a:r>
-              <a:rPr lang="en-US" dirty="0" err="1" smtClean="0"/>
-              <a:t>pm</a:t>
-            </a:r>
-            <a:r>
-              <a:rPr lang="en-US" dirty="0" smtClean="0"/>
-              <a:t> </a:t>
-            </a:r>
-            <a:r>
-              <a:rPr lang="en-US" dirty="0" err="1" smtClean="0"/>
-              <a:t>i</a:t>
-            </a:r>
-            <a:endParaRPr lang="en-US" dirty="0" smtClean="0"/>
-          </a:p>
-          <a:p>
-            <a:pPr lvl="1"/>
+              <a:t>npm</a:t>
+            </a:r>
+            <a:r>
+              <a:rPr lang="en-US" dirty="0"/>
+              <a:t> start</a:t>
+            </a:r>
+          </a:p>
+          <a:p>
+            <a:endParaRPr lang="en-US" dirty="0"/>
+          </a:p>
+          <a:p>
+            <a:r>
+              <a:rPr lang="en-US" dirty="0"/>
+              <a:t>GET http://localhost:8090/pokemon		</a:t>
+            </a:r>
             <a:r>
               <a:rPr lang="en-US" dirty="0" err="1"/>
-              <a:t>n</a:t>
-            </a:r>
-            <a:r>
-              <a:rPr lang="en-US" dirty="0" err="1" smtClean="0"/>
-              <a:t>pm</a:t>
-            </a:r>
-            <a:r>
-              <a:rPr lang="en-US" dirty="0" smtClean="0"/>
-              <a:t> start</a:t>
+              <a:t>LiefertListe</a:t>
             </a:r>
             <a:endParaRPr lang="en-US" dirty="0"/>
           </a:p>
+          <a:p>
+            <a:r>
+              <a:rPr lang="en-US" dirty="0"/>
+              <a:t>GET http://localhost:8090/pokemon/{id}	</a:t>
+            </a:r>
+            <a:r>
+              <a:rPr lang="en-US" dirty="0" err="1"/>
+              <a:t>Liefert</a:t>
+            </a:r>
+            <a:r>
+              <a:rPr lang="en-US" dirty="0"/>
+              <a:t> Details </a:t>
+            </a:r>
+          </a:p>
         </p:txBody>
       </p:sp>
       <p:sp>
@@ -7682,7 +7736,7 @@
           <a:lstStyle/>
           <a:p>
             <a:r>
-              <a:rPr lang="de-DE" smtClean="0"/>
+              <a:rPr lang="de-DE"/>
               <a:t>Thinktecture AG</a:t>
             </a:r>
             <a:endParaRPr lang="de-DE" dirty="0"/>
@@ -7758,10 +7812,9 @@
           <a:lstStyle/>
           <a:p>
             <a:r>
-              <a:rPr lang="en-US" dirty="0" smtClean="0"/>
+              <a:rPr lang="en-US" dirty="0"/>
               <a:t>Angular 2</a:t>
             </a:r>
-            <a:endParaRPr lang="en-US" dirty="0"/>
           </a:p>
         </p:txBody>
       </p:sp>
@@ -7781,48 +7834,47 @@
           <a:lstStyle/>
           <a:p>
             <a:r>
-              <a:rPr lang="en-US" dirty="0" smtClean="0"/>
+              <a:rPr lang="en-US" dirty="0"/>
               <a:t>Was </a:t>
             </a:r>
             <a:r>
-              <a:rPr lang="en-US" dirty="0" err="1" smtClean="0"/>
+              <a:rPr lang="en-US" dirty="0" err="1"/>
               <a:t>ist</a:t>
             </a:r>
             <a:r>
-              <a:rPr lang="en-US" dirty="0" smtClean="0"/>
+              <a:rPr lang="en-US" dirty="0"/>
               <a:t> Angular?</a:t>
             </a:r>
           </a:p>
           <a:p>
             <a:r>
-              <a:rPr lang="en-US" dirty="0" smtClean="0"/>
+              <a:rPr lang="en-US" dirty="0"/>
               <a:t>Was </a:t>
             </a:r>
             <a:r>
-              <a:rPr lang="en-US" dirty="0" err="1" smtClean="0"/>
+              <a:rPr lang="en-US" dirty="0" err="1"/>
               <a:t>ist</a:t>
             </a:r>
             <a:r>
-              <a:rPr lang="en-US" dirty="0" smtClean="0"/>
+              <a:rPr lang="en-US" dirty="0"/>
               <a:t> </a:t>
             </a:r>
             <a:r>
-              <a:rPr lang="en-US" dirty="0" err="1" smtClean="0"/>
+              <a:rPr lang="en-US" dirty="0" err="1"/>
               <a:t>es</a:t>
             </a:r>
             <a:r>
-              <a:rPr lang="en-US" dirty="0" smtClean="0"/>
+              <a:rPr lang="en-US" dirty="0"/>
               <a:t> </a:t>
             </a:r>
             <a:r>
-              <a:rPr lang="en-US" dirty="0" err="1" smtClean="0"/>
+              <a:rPr lang="en-US" dirty="0" err="1"/>
               <a:t>nicht</a:t>
             </a:r>
             <a:r>
-              <a:rPr lang="en-US" dirty="0" smtClean="0"/>
+              <a:rPr lang="en-US" dirty="0"/>
               <a:t>?</a:t>
             </a:r>
-            <a:endParaRPr lang="en-US" dirty="0"/>
           </a:p>
         </p:txBody>
       </p:sp>
@@ -7842,7 +7894,7 @@
           <a:lstStyle/>
           <a:p>
             <a:r>
-              <a:rPr lang="de-DE" smtClean="0"/>
+              <a:rPr lang="de-DE"/>
               <a:t>Thinktecture AG</a:t>
             </a:r>
             <a:endParaRPr lang="de-DE" dirty="0"/>
@@ -7918,15 +7970,15 @@
           <a:lstStyle/>
           <a:p>
             <a:r>
-              <a:rPr lang="en-US" dirty="0" err="1" smtClean="0"/>
+              <a:rPr lang="en-US" dirty="0" err="1"/>
               <a:t>Komponenten</a:t>
             </a:r>
             <a:r>
-              <a:rPr lang="en-US" dirty="0" smtClean="0"/>
+              <a:rPr lang="en-US" dirty="0"/>
               <a:t> und </a:t>
             </a:r>
             <a:r>
-              <a:rPr lang="en-US" dirty="0" err="1" smtClean="0"/>
+              <a:rPr lang="en-US" dirty="0" err="1"/>
               <a:t>Direktiven</a:t>
             </a:r>
             <a:endParaRPr lang="en-US" dirty="0"/>
@@ -7949,110 +8001,109 @@
           <a:lstStyle/>
           <a:p>
             <a:r>
-              <a:rPr lang="en-US" dirty="0" smtClean="0"/>
+              <a:rPr lang="en-US" dirty="0"/>
               <a:t>Was </a:t>
             </a:r>
             <a:r>
-              <a:rPr lang="en-US" dirty="0" err="1" smtClean="0"/>
+              <a:rPr lang="en-US" dirty="0" err="1"/>
               <a:t>sind</a:t>
             </a:r>
             <a:r>
-              <a:rPr lang="en-US" dirty="0" smtClean="0"/>
+              <a:rPr lang="en-US" dirty="0"/>
               <a:t> </a:t>
             </a:r>
             <a:r>
-              <a:rPr lang="en-US" dirty="0" err="1" smtClean="0"/>
+              <a:rPr lang="en-US" dirty="0" err="1"/>
               <a:t>Komponenten</a:t>
             </a:r>
             <a:r>
-              <a:rPr lang="en-US" dirty="0" smtClean="0"/>
+              <a:rPr lang="en-US" dirty="0"/>
               <a:t>?</a:t>
             </a:r>
           </a:p>
           <a:p>
             <a:pPr lvl="1"/>
             <a:r>
-              <a:rPr lang="en-US" dirty="0" err="1" smtClean="0"/>
+              <a:rPr lang="en-US" dirty="0" err="1"/>
               <a:t>Erstellen</a:t>
             </a:r>
             <a:r>
-              <a:rPr lang="en-US" dirty="0" smtClean="0"/>
+              <a:rPr lang="en-US" dirty="0"/>
               <a:t> </a:t>
             </a:r>
             <a:r>
-              <a:rPr lang="en-US" dirty="0" err="1" smtClean="0"/>
+              <a:rPr lang="en-US" dirty="0" err="1"/>
               <a:t>neues</a:t>
             </a:r>
             <a:r>
-              <a:rPr lang="en-US" dirty="0" smtClean="0"/>
+              <a:rPr lang="en-US" dirty="0"/>
               <a:t> HTML</a:t>
             </a:r>
           </a:p>
           <a:p>
             <a:r>
-              <a:rPr lang="en-US" dirty="0" smtClean="0"/>
+              <a:rPr lang="en-US" dirty="0"/>
               <a:t>Was </a:t>
             </a:r>
             <a:r>
-              <a:rPr lang="en-US" dirty="0" err="1" smtClean="0"/>
+              <a:rPr lang="en-US" dirty="0" err="1"/>
               <a:t>sind</a:t>
             </a:r>
             <a:r>
-              <a:rPr lang="en-US" dirty="0" smtClean="0"/>
+              <a:rPr lang="en-US" dirty="0"/>
               <a:t> </a:t>
             </a:r>
             <a:r>
-              <a:rPr lang="en-US" dirty="0" err="1" smtClean="0"/>
+              <a:rPr lang="en-US" dirty="0" err="1"/>
               <a:t>Direktiven</a:t>
             </a:r>
             <a:r>
-              <a:rPr lang="en-US" dirty="0" smtClean="0"/>
+              <a:rPr lang="en-US" dirty="0"/>
               <a:t>?</a:t>
             </a:r>
           </a:p>
           <a:p>
             <a:pPr lvl="1"/>
             <a:r>
-              <a:rPr lang="en-US" dirty="0" err="1" smtClean="0"/>
+              <a:rPr lang="en-US" dirty="0" err="1"/>
               <a:t>Nehmen</a:t>
             </a:r>
             <a:r>
-              <a:rPr lang="en-US" dirty="0" smtClean="0"/>
+              <a:rPr lang="en-US" dirty="0"/>
               <a:t> </a:t>
             </a:r>
             <a:r>
-              <a:rPr lang="en-US" dirty="0" err="1" smtClean="0"/>
+              <a:rPr lang="en-US" dirty="0" err="1"/>
               <a:t>Einfluss</a:t>
             </a:r>
             <a:r>
-              <a:rPr lang="en-US" dirty="0" smtClean="0"/>
+              <a:rPr lang="en-US" dirty="0"/>
               <a:t> auf den DOM </a:t>
             </a:r>
             <a:r>
-              <a:rPr lang="en-US" dirty="0" err="1" smtClean="0"/>
+              <a:rPr lang="en-US" dirty="0" err="1"/>
               <a:t>innerhalb</a:t>
             </a:r>
             <a:r>
-              <a:rPr lang="en-US" dirty="0" smtClean="0"/>
+              <a:rPr lang="en-US" dirty="0"/>
               <a:t> </a:t>
             </a:r>
             <a:r>
-              <a:rPr lang="en-US" dirty="0" err="1" smtClean="0"/>
+              <a:rPr lang="en-US" dirty="0" err="1"/>
               <a:t>oder</a:t>
             </a:r>
             <a:r>
-              <a:rPr lang="en-US" dirty="0" smtClean="0"/>
+              <a:rPr lang="en-US" dirty="0"/>
               <a:t> auf </a:t>
             </a:r>
             <a:r>
-              <a:rPr lang="en-US" dirty="0" err="1" smtClean="0"/>
+              <a:rPr lang="en-US" dirty="0" err="1"/>
               <a:t>einem</a:t>
             </a:r>
             <a:r>
-              <a:rPr lang="en-US" dirty="0" smtClean="0"/>
+              <a:rPr lang="en-US" dirty="0"/>
               <a:t> HTML-Tag</a:t>
             </a:r>
-            <a:endParaRPr lang="en-US" dirty="0"/>
           </a:p>
         </p:txBody>
       </p:sp>
@@ -8072,7 +8123,7 @@
           <a:lstStyle/>
           <a:p>
             <a:r>
-              <a:rPr lang="de-DE" smtClean="0"/>
+              <a:rPr lang="de-DE"/>
               <a:t>Thinktecture AG</a:t>
             </a:r>
             <a:endParaRPr lang="de-DE" dirty="0"/>

</xml_diff>